<commit_message>
fix: add pitch deck 1.1
</commit_message>
<xml_diff>
--- a/Pitch deck - File Sorter.pptx
+++ b/Pitch deck - File Sorter.pptx
@@ -2,7 +2,7 @@
 <file path=ppt/presentation.xml><?xml version="1.0" encoding="utf-8"?>
 <p:presentation xmlns:a="http://schemas.openxmlformats.org/drawingml/2006/main" xmlns:r="http://schemas.openxmlformats.org/officeDocument/2006/relationships" xmlns:mc="http://schemas.openxmlformats.org/markup-compatibility/2006" xmlns:mv="urn:schemas-microsoft-com:mac:vml" xmlns:p="http://schemas.openxmlformats.org/presentationml/2006/main" xmlns:c="http://schemas.openxmlformats.org/drawingml/2006/chart" xmlns:dgm="http://schemas.openxmlformats.org/drawingml/2006/diagram" xmlns:o="urn:schemas-microsoft-com:office:office" xmlns:v="urn:schemas-microsoft-com:vml" xmlns:pvml="urn:schemas-microsoft-com:office:powerpoint" xmlns:com="http://schemas.openxmlformats.org/drawingml/2006/compatibility" xmlns:p14="http://schemas.microsoft.com/office/powerpoint/2010/main" xmlns:p15="http://schemas.microsoft.com/office/powerpoint/2012/main" xmlns:ahyp="http://schemas.microsoft.com/office/drawing/2018/hyperlinkcolor" autoCompressPictures="0" embedTrueTypeFonts="1" strictFirstAndLastChars="0" saveSubsetFonts="1">
   <p:sldMasterIdLst>
-    <p:sldMasterId id="2147483648" r:id="rId4"/>
+    <p:sldMasterId id="2147483659" r:id="rId4"/>
   </p:sldMasterIdLst>
   <p:notesMasterIdLst>
     <p:notesMasterId r:id="rId5"/>
@@ -19,6 +19,13 @@
       <p:font typeface="Caveat"/>
       <p:regular r:id="rId9"/>
       <p:bold r:id="rId10"/>
+    </p:embeddedFont>
+    <p:embeddedFont>
+      <p:font typeface="Roboto"/>
+      <p:regular r:id="rId11"/>
+      <p:bold r:id="rId12"/>
+      <p:italic r:id="rId13"/>
+      <p:boldItalic r:id="rId14"/>
     </p:embeddedFont>
   </p:embeddedFontLst>
   <p:defaultTextStyle>
@@ -264,9 +271,6 @@
           </p15:clr>
         </p15:guide>
       </p15:sldGuideLst>
-    </p:ext>
-    <p:ext uri="http://customooxmlschemas.google.com/">
-      <go:slidesCustomData xmlns:go="http://customooxmlschemas.google.com/" r:id="rId11" roundtripDataSignature="AMtx7mjNpv3kDOnzaExigCsmaYw2EFUkIg=="/>
     </p:ext>
   </p:extLst>
 </p:presentation>
@@ -1203,7 +1207,7 @@
       </p:grpSpPr>
       <p:sp>
         <p:nvSpPr>
-          <p:cNvPr id="10" name="Google Shape;10;p5"/>
+          <p:cNvPr id="10" name="Google Shape;10;p2"/>
           <p:cNvSpPr/>
           <p:nvPr/>
         </p:nvSpPr>
@@ -1262,7 +1266,7 @@
       </p:sp>
       <p:sp>
         <p:nvSpPr>
-          <p:cNvPr id="11" name="Google Shape;11;p5"/>
+          <p:cNvPr id="11" name="Google Shape;11;p2"/>
           <p:cNvSpPr txBox="1"/>
           <p:nvPr>
             <p:ph type="title"/>
@@ -1418,7 +1422,7 @@
       </p:sp>
       <p:sp>
         <p:nvSpPr>
-          <p:cNvPr id="12" name="Google Shape;12;p5"/>
+          <p:cNvPr id="12" name="Google Shape;12;p2"/>
           <p:cNvSpPr txBox="1"/>
           <p:nvPr>
             <p:ph idx="1" type="subTitle"/>
@@ -1574,7 +1578,7 @@
       </p:sp>
       <p:sp>
         <p:nvSpPr>
-          <p:cNvPr id="13" name="Google Shape;13;p5"/>
+          <p:cNvPr id="13" name="Google Shape;13;p2"/>
           <p:cNvSpPr txBox="1"/>
           <p:nvPr>
             <p:ph idx="2" type="body"/>
@@ -1730,7 +1734,7 @@
       </p:sp>
       <p:sp>
         <p:nvSpPr>
-          <p:cNvPr id="14" name="Google Shape;14;p5"/>
+          <p:cNvPr id="14" name="Google Shape;14;p2"/>
           <p:cNvSpPr txBox="1"/>
           <p:nvPr>
             <p:ph idx="12" type="sldNum"/>
@@ -2034,7 +2038,7 @@
       </p:grpSpPr>
       <p:sp>
         <p:nvSpPr>
-          <p:cNvPr id="45" name="Google Shape;45;p14"/>
+          <p:cNvPr id="45" name="Google Shape;45;p11"/>
           <p:cNvSpPr txBox="1"/>
           <p:nvPr>
             <p:ph hasCustomPrompt="1" type="title"/>
@@ -2194,7 +2198,7 @@
       </p:sp>
       <p:sp>
         <p:nvSpPr>
-          <p:cNvPr id="46" name="Google Shape;46;p14"/>
+          <p:cNvPr id="46" name="Google Shape;46;p11"/>
           <p:cNvSpPr txBox="1"/>
           <p:nvPr>
             <p:ph idx="1" type="body"/>
@@ -2350,7 +2354,7 @@
       </p:sp>
       <p:sp>
         <p:nvSpPr>
-          <p:cNvPr id="47" name="Google Shape;47;p14"/>
+          <p:cNvPr id="47" name="Google Shape;47;p11"/>
           <p:cNvSpPr txBox="1"/>
           <p:nvPr>
             <p:ph idx="12" type="sldNum"/>
@@ -2654,7 +2658,7 @@
       </p:grpSpPr>
       <p:sp>
         <p:nvSpPr>
-          <p:cNvPr id="49" name="Google Shape;49;p15"/>
+          <p:cNvPr id="49" name="Google Shape;49;p12"/>
           <p:cNvSpPr txBox="1"/>
           <p:nvPr>
             <p:ph idx="12" type="sldNum"/>
@@ -2958,7 +2962,7 @@
       </p:grpSpPr>
       <p:sp>
         <p:nvSpPr>
-          <p:cNvPr id="16" name="Google Shape;16;p6"/>
+          <p:cNvPr id="16" name="Google Shape;16;p3"/>
           <p:cNvSpPr txBox="1"/>
           <p:nvPr>
             <p:ph type="title"/>
@@ -3114,7 +3118,7 @@
       </p:sp>
       <p:sp>
         <p:nvSpPr>
-          <p:cNvPr id="17" name="Google Shape;17;p6"/>
+          <p:cNvPr id="17" name="Google Shape;17;p3"/>
           <p:cNvSpPr txBox="1"/>
           <p:nvPr>
             <p:ph idx="1" type="body"/>
@@ -3270,7 +3274,7 @@
       </p:sp>
       <p:sp>
         <p:nvSpPr>
-          <p:cNvPr id="18" name="Google Shape;18;p6"/>
+          <p:cNvPr id="18" name="Google Shape;18;p3"/>
           <p:cNvSpPr txBox="1"/>
           <p:nvPr>
             <p:ph idx="12" type="sldNum"/>
@@ -3574,7 +3578,7 @@
       </p:grpSpPr>
       <p:sp>
         <p:nvSpPr>
-          <p:cNvPr id="20" name="Google Shape;20;p7"/>
+          <p:cNvPr id="20" name="Google Shape;20;p4"/>
           <p:cNvSpPr txBox="1"/>
           <p:nvPr>
             <p:ph type="title"/>
@@ -3730,7 +3734,7 @@
       </p:sp>
       <p:sp>
         <p:nvSpPr>
-          <p:cNvPr id="21" name="Google Shape;21;p7"/>
+          <p:cNvPr id="21" name="Google Shape;21;p4"/>
           <p:cNvSpPr txBox="1"/>
           <p:nvPr>
             <p:ph idx="1" type="body"/>
@@ -3886,7 +3890,7 @@
       </p:sp>
       <p:sp>
         <p:nvSpPr>
-          <p:cNvPr id="22" name="Google Shape;22;p7"/>
+          <p:cNvPr id="22" name="Google Shape;22;p4"/>
           <p:cNvSpPr txBox="1"/>
           <p:nvPr>
             <p:ph idx="2" type="body"/>
@@ -4042,7 +4046,7 @@
       </p:sp>
       <p:sp>
         <p:nvSpPr>
-          <p:cNvPr id="23" name="Google Shape;23;p7"/>
+          <p:cNvPr id="23" name="Google Shape;23;p4"/>
           <p:cNvSpPr txBox="1"/>
           <p:nvPr>
             <p:ph idx="12" type="sldNum"/>
@@ -4346,7 +4350,7 @@
       </p:grpSpPr>
       <p:sp>
         <p:nvSpPr>
-          <p:cNvPr id="25" name="Google Shape;25;p8"/>
+          <p:cNvPr id="25" name="Google Shape;25;p5"/>
           <p:cNvSpPr txBox="1"/>
           <p:nvPr>
             <p:ph type="ctrTitle"/>
@@ -4502,7 +4506,7 @@
       </p:sp>
       <p:sp>
         <p:nvSpPr>
-          <p:cNvPr id="26" name="Google Shape;26;p8"/>
+          <p:cNvPr id="26" name="Google Shape;26;p5"/>
           <p:cNvSpPr txBox="1"/>
           <p:nvPr>
             <p:ph idx="1" type="subTitle"/>
@@ -4658,7 +4662,7 @@
       </p:sp>
       <p:sp>
         <p:nvSpPr>
-          <p:cNvPr id="27" name="Google Shape;27;p8"/>
+          <p:cNvPr id="27" name="Google Shape;27;p5"/>
           <p:cNvSpPr txBox="1"/>
           <p:nvPr>
             <p:ph idx="12" type="sldNum"/>
@@ -4962,7 +4966,7 @@
       </p:grpSpPr>
       <p:sp>
         <p:nvSpPr>
-          <p:cNvPr id="29" name="Google Shape;29;p9"/>
+          <p:cNvPr id="29" name="Google Shape;29;p6"/>
           <p:cNvSpPr txBox="1"/>
           <p:nvPr>
             <p:ph type="title"/>
@@ -5118,7 +5122,7 @@
       </p:sp>
       <p:sp>
         <p:nvSpPr>
-          <p:cNvPr id="30" name="Google Shape;30;p9"/>
+          <p:cNvPr id="30" name="Google Shape;30;p6"/>
           <p:cNvSpPr txBox="1"/>
           <p:nvPr>
             <p:ph idx="12" type="sldNum"/>
@@ -5422,7 +5426,7 @@
       </p:grpSpPr>
       <p:sp>
         <p:nvSpPr>
-          <p:cNvPr id="32" name="Google Shape;32;p10"/>
+          <p:cNvPr id="32" name="Google Shape;32;p7"/>
           <p:cNvSpPr txBox="1"/>
           <p:nvPr>
             <p:ph type="title"/>
@@ -5578,7 +5582,7 @@
       </p:sp>
       <p:sp>
         <p:nvSpPr>
-          <p:cNvPr id="33" name="Google Shape;33;p10"/>
+          <p:cNvPr id="33" name="Google Shape;33;p7"/>
           <p:cNvSpPr txBox="1"/>
           <p:nvPr>
             <p:ph idx="1" type="body"/>
@@ -5734,7 +5738,7 @@
       </p:sp>
       <p:sp>
         <p:nvSpPr>
-          <p:cNvPr id="34" name="Google Shape;34;p10"/>
+          <p:cNvPr id="34" name="Google Shape;34;p7"/>
           <p:cNvSpPr txBox="1"/>
           <p:nvPr>
             <p:ph idx="12" type="sldNum"/>
@@ -6038,7 +6042,7 @@
       </p:grpSpPr>
       <p:sp>
         <p:nvSpPr>
-          <p:cNvPr id="36" name="Google Shape;36;p11"/>
+          <p:cNvPr id="36" name="Google Shape;36;p8"/>
           <p:cNvSpPr txBox="1"/>
           <p:nvPr>
             <p:ph type="title"/>
@@ -6194,7 +6198,7 @@
       </p:sp>
       <p:sp>
         <p:nvSpPr>
-          <p:cNvPr id="37" name="Google Shape;37;p11"/>
+          <p:cNvPr id="37" name="Google Shape;37;p8"/>
           <p:cNvSpPr txBox="1"/>
           <p:nvPr>
             <p:ph idx="12" type="sldNum"/>
@@ -6498,7 +6502,7 @@
       </p:grpSpPr>
       <p:sp>
         <p:nvSpPr>
-          <p:cNvPr id="39" name="Google Shape;39;p12"/>
+          <p:cNvPr id="39" name="Google Shape;39;p9"/>
           <p:cNvSpPr txBox="1"/>
           <p:nvPr>
             <p:ph type="title"/>
@@ -6654,7 +6658,7 @@
       </p:sp>
       <p:sp>
         <p:nvSpPr>
-          <p:cNvPr id="40" name="Google Shape;40;p12"/>
+          <p:cNvPr id="40" name="Google Shape;40;p9"/>
           <p:cNvSpPr txBox="1"/>
           <p:nvPr>
             <p:ph idx="12" type="sldNum"/>
@@ -6958,7 +6962,7 @@
       </p:grpSpPr>
       <p:sp>
         <p:nvSpPr>
-          <p:cNvPr id="42" name="Google Shape;42;p13"/>
+          <p:cNvPr id="42" name="Google Shape;42;p10"/>
           <p:cNvSpPr txBox="1"/>
           <p:nvPr>
             <p:ph idx="1" type="body"/>
@@ -7002,7 +7006,7 @@
       </p:sp>
       <p:sp>
         <p:nvSpPr>
-          <p:cNvPr id="43" name="Google Shape;43;p13"/>
+          <p:cNvPr id="43" name="Google Shape;43;p10"/>
           <p:cNvSpPr txBox="1"/>
           <p:nvPr>
             <p:ph idx="12" type="sldNum"/>
@@ -7313,7 +7317,7 @@
       </p:grpSpPr>
       <p:sp>
         <p:nvSpPr>
-          <p:cNvPr id="6" name="Google Shape;6;p4"/>
+          <p:cNvPr id="6" name="Google Shape;6;p1"/>
           <p:cNvSpPr txBox="1"/>
           <p:nvPr>
             <p:ph type="title"/>
@@ -7577,7 +7581,7 @@
       </p:sp>
       <p:sp>
         <p:nvSpPr>
-          <p:cNvPr id="7" name="Google Shape;7;p4"/>
+          <p:cNvPr id="7" name="Google Shape;7;p1"/>
           <p:cNvSpPr txBox="1"/>
           <p:nvPr>
             <p:ph idx="1" type="body"/>
@@ -7841,7 +7845,7 @@
       </p:sp>
       <p:sp>
         <p:nvSpPr>
-          <p:cNvPr id="8" name="Google Shape;8;p4"/>
+          <p:cNvPr id="8" name="Google Shape;8;p1"/>
           <p:cNvSpPr txBox="1"/>
           <p:nvPr>
             <p:ph idx="12" type="sldNum"/>
@@ -8122,17 +8126,17 @@
   </p:cSld>
   <p:clrMap accent1="accent1" accent2="accent2" accent3="accent3" accent4="accent4" accent5="accent5" accent6="accent6" bg1="lt1" bg2="dk2" tx1="dk1" tx2="lt2" folHlink="folHlink" hlink="hlink"/>
   <p:sldLayoutIdLst>
-    <p:sldLayoutId id="2147483649" r:id="rId1"/>
-    <p:sldLayoutId id="2147483650" r:id="rId2"/>
-    <p:sldLayoutId id="2147483651" r:id="rId3"/>
-    <p:sldLayoutId id="2147483652" r:id="rId4"/>
-    <p:sldLayoutId id="2147483653" r:id="rId5"/>
-    <p:sldLayoutId id="2147483654" r:id="rId6"/>
-    <p:sldLayoutId id="2147483655" r:id="rId7"/>
-    <p:sldLayoutId id="2147483656" r:id="rId8"/>
-    <p:sldLayoutId id="2147483657" r:id="rId9"/>
-    <p:sldLayoutId id="2147483658" r:id="rId10"/>
-    <p:sldLayoutId id="2147483659" r:id="rId11"/>
+    <p:sldLayoutId id="2147483648" r:id="rId1"/>
+    <p:sldLayoutId id="2147483649" r:id="rId2"/>
+    <p:sldLayoutId id="2147483650" r:id="rId3"/>
+    <p:sldLayoutId id="2147483651" r:id="rId4"/>
+    <p:sldLayoutId id="2147483652" r:id="rId5"/>
+    <p:sldLayoutId id="2147483653" r:id="rId6"/>
+    <p:sldLayoutId id="2147483654" r:id="rId7"/>
+    <p:sldLayoutId id="2147483655" r:id="rId8"/>
+    <p:sldLayoutId id="2147483656" r:id="rId9"/>
+    <p:sldLayoutId id="2147483657" r:id="rId10"/>
+    <p:sldLayoutId id="2147483658" r:id="rId11"/>
   </p:sldLayoutIdLst>
   <p:hf dt="0" ftr="0" hdr="0" sldNum="0"/>
   <p:txStyles>
@@ -8846,7 +8850,7 @@
       </p:grpSpPr>
       <p:sp>
         <p:nvSpPr>
-          <p:cNvPr id="54" name="Google Shape;54;p1"/>
+          <p:cNvPr id="54" name="Google Shape;54;p13"/>
           <p:cNvSpPr txBox="1"/>
           <p:nvPr>
             <p:ph idx="2" type="body"/>
@@ -8906,11 +8910,7 @@
             </a:pPr>
             <a:r>
               <a:rPr lang="it"/>
-              <a:t>My talent is</a:t>
-            </a:r>
-            <a:r>
-              <a:rPr lang="it"/>
-              <a:t> </a:t>
+              <a:t>My talent is </a:t>
             </a:r>
             <a:r>
               <a:rPr i="1" lang="it"/>
@@ -8938,11 +8938,7 @@
             </a:r>
             <a:r>
               <a:rPr i="1" lang="it"/>
-              <a:t>s</a:t>
-            </a:r>
-            <a:r>
-              <a:rPr i="1" lang="it"/>
-              <a:t>hort memory</a:t>
+              <a:t>short memory</a:t>
             </a:r>
             <a:endParaRPr i="1"/>
           </a:p>
@@ -8974,17 +8970,16 @@
       </p:sp>
       <p:pic>
         <p:nvPicPr>
-          <p:cNvPr id="55" name="Google Shape;55;p1"/>
+          <p:cNvPr id="55" name="Google Shape;55;p13"/>
           <p:cNvPicPr preferRelativeResize="0"/>
           <p:nvPr/>
         </p:nvPicPr>
-        <p:blipFill>
+        <p:blipFill rotWithShape="1">
           <a:blip r:embed="rId3">
             <a:alphaModFix/>
           </a:blip>
-          <a:stretch>
-            <a:fillRect/>
-          </a:stretch>
+          <a:srcRect b="0" l="0" r="0" t="0"/>
+          <a:stretch/>
         </p:blipFill>
         <p:spPr>
           <a:xfrm>
@@ -9027,7 +9022,7 @@
       </p:grpSpPr>
       <p:sp>
         <p:nvSpPr>
-          <p:cNvPr id="60" name="Google Shape;60;p2"/>
+          <p:cNvPr id="60" name="Google Shape;60;p14"/>
           <p:cNvSpPr txBox="1"/>
           <p:nvPr>
             <p:ph type="title"/>
@@ -9075,7 +9070,7 @@
       </p:sp>
       <p:sp>
         <p:nvSpPr>
-          <p:cNvPr id="61" name="Google Shape;61;p2"/>
+          <p:cNvPr id="61" name="Google Shape;61;p14"/>
           <p:cNvSpPr txBox="1"/>
           <p:nvPr>
             <p:ph idx="1" type="body"/>
@@ -9203,7 +9198,7 @@
       </p:sp>
       <p:pic>
         <p:nvPicPr>
-          <p:cNvPr id="62" name="Google Shape;62;p2"/>
+          <p:cNvPr id="62" name="Google Shape;62;p14"/>
           <p:cNvPicPr preferRelativeResize="0"/>
           <p:nvPr/>
         </p:nvPicPr>
@@ -9230,7 +9225,7 @@
       </p:pic>
       <p:pic>
         <p:nvPicPr>
-          <p:cNvPr id="63" name="Google Shape;63;p2"/>
+          <p:cNvPr id="63" name="Google Shape;63;p14"/>
           <p:cNvPicPr preferRelativeResize="0"/>
           <p:nvPr/>
         </p:nvPicPr>
@@ -9238,7 +9233,7 @@
           <a:blip r:embed="rId4">
             <a:alphaModFix/>
           </a:blip>
-          <a:srcRect b="7437" l="0" r="0" t="15169"/>
+          <a:srcRect b="7437" l="0" r="0" t="15168"/>
           <a:stretch/>
         </p:blipFill>
         <p:spPr>
@@ -9257,7 +9252,7 @@
       </p:pic>
       <p:pic>
         <p:nvPicPr>
-          <p:cNvPr id="64" name="Google Shape;64;p2"/>
+          <p:cNvPr id="64" name="Google Shape;64;p14"/>
           <p:cNvPicPr preferRelativeResize="0"/>
           <p:nvPr/>
         </p:nvPicPr>
@@ -9265,7 +9260,7 @@
           <a:blip r:embed="rId5">
             <a:alphaModFix/>
           </a:blip>
-          <a:srcRect b="7475" l="0" r="0" t="13172"/>
+          <a:srcRect b="7474" l="0" r="0" t="13172"/>
           <a:stretch/>
         </p:blipFill>
         <p:spPr>
@@ -9284,7 +9279,7 @@
       </p:pic>
       <p:pic>
         <p:nvPicPr>
-          <p:cNvPr id="65" name="Google Shape;65;p2"/>
+          <p:cNvPr id="65" name="Google Shape;65;p14"/>
           <p:cNvPicPr preferRelativeResize="0"/>
           <p:nvPr/>
         </p:nvPicPr>
@@ -9311,12 +9306,12 @@
       </p:pic>
       <p:pic>
         <p:nvPicPr>
-          <p:cNvPr id="66" name="Google Shape;66;p2"/>
+          <p:cNvPr id="66" name="Google Shape;66;p14"/>
           <p:cNvPicPr preferRelativeResize="0"/>
           <p:nvPr/>
         </p:nvPicPr>
         <p:blipFill rotWithShape="1">
-          <a:blip r:embed="rId6">
+          <a:blip r:embed="rId7">
             <a:alphaModFix/>
           </a:blip>
           <a:srcRect b="0" l="0" r="83997" t="0"/>
@@ -9338,15 +9333,15 @@
       </p:pic>
       <p:pic>
         <p:nvPicPr>
-          <p:cNvPr id="67" name="Google Shape;67;p2"/>
+          <p:cNvPr id="67" name="Google Shape;67;p14"/>
           <p:cNvPicPr preferRelativeResize="0"/>
           <p:nvPr/>
         </p:nvPicPr>
         <p:blipFill rotWithShape="1">
-          <a:blip r:embed="rId6">
+          <a:blip r:embed="rId8">
             <a:alphaModFix/>
           </a:blip>
-          <a:srcRect b="0" l="31415" r="29871" t="0"/>
+          <a:srcRect b="0" l="31415" r="29870" t="0"/>
           <a:stretch/>
         </p:blipFill>
         <p:spPr>
@@ -9365,7 +9360,7 @@
       </p:pic>
       <p:sp>
         <p:nvSpPr>
-          <p:cNvPr id="68" name="Google Shape;68;p2"/>
+          <p:cNvPr id="68" name="Google Shape;68;p14"/>
           <p:cNvSpPr txBox="1"/>
           <p:nvPr/>
         </p:nvSpPr>
@@ -9388,17 +9383,25 @@
           </a:bodyPr>
           <a:lstStyle/>
           <a:p>
-            <a:pPr indent="0" lvl="0" marL="0" rtl="0" algn="l">
-              <a:spcBef>
-                <a:spcPts val="0"/>
-              </a:spcBef>
-              <a:spcAft>
-                <a:spcPts val="0"/>
-              </a:spcAft>
+            <a:pPr indent="0" lvl="0" marL="0" marR="0" rtl="0" algn="l">
+              <a:lnSpc>
+                <a:spcPct val="100000"/>
+              </a:lnSpc>
+              <a:spcBef>
+                <a:spcPts val="0"/>
+              </a:spcBef>
+              <a:spcAft>
+                <a:spcPts val="0"/>
+              </a:spcAft>
+              <a:buClr>
+                <a:srgbClr val="000000"/>
+              </a:buClr>
+              <a:buSzPts val="5100"/>
+              <a:buFont typeface="Arial"/>
               <a:buNone/>
             </a:pPr>
             <a:r>
-              <a:rPr b="1" lang="it" sz="5100">
+              <a:rPr b="1" i="0" lang="it" sz="5100" u="none" cap="none" strike="noStrike">
                 <a:solidFill>
                   <a:srgbClr val="6AA84F"/>
                 </a:solidFill>
@@ -9409,7 +9412,7 @@
               </a:rPr>
               <a:t>Coming</a:t>
             </a:r>
-            <a:endParaRPr b="1" sz="5100">
+            <a:endParaRPr b="1" i="0" sz="5100" u="none" cap="none" strike="noStrike">
               <a:solidFill>
                 <a:srgbClr val="6AA84F"/>
               </a:solidFill>
@@ -9420,17 +9423,25 @@
             </a:endParaRPr>
           </a:p>
           <a:p>
-            <a:pPr indent="0" lvl="0" marL="0" rtl="0" algn="l">
-              <a:spcBef>
-                <a:spcPts val="0"/>
-              </a:spcBef>
-              <a:spcAft>
-                <a:spcPts val="0"/>
-              </a:spcAft>
+            <a:pPr indent="0" lvl="0" marL="0" marR="0" rtl="0" algn="l">
+              <a:lnSpc>
+                <a:spcPct val="100000"/>
+              </a:lnSpc>
+              <a:spcBef>
+                <a:spcPts val="0"/>
+              </a:spcBef>
+              <a:spcAft>
+                <a:spcPts val="0"/>
+              </a:spcAft>
+              <a:buClr>
+                <a:srgbClr val="000000"/>
+              </a:buClr>
+              <a:buSzPts val="5100"/>
+              <a:buFont typeface="Arial"/>
               <a:buNone/>
             </a:pPr>
             <a:r>
-              <a:rPr b="1" lang="it" sz="5100">
+              <a:rPr b="1" i="0" lang="it" sz="5100" u="none" cap="none" strike="noStrike">
                 <a:solidFill>
                   <a:srgbClr val="6AA84F"/>
                 </a:solidFill>
@@ -9441,7 +9452,7 @@
               </a:rPr>
               <a:t>Soon</a:t>
             </a:r>
-            <a:endParaRPr b="1" sz="5100">
+            <a:endParaRPr b="1" i="0" sz="5100" u="none" cap="none" strike="noStrike">
               <a:solidFill>
                 <a:srgbClr val="6AA84F"/>
               </a:solidFill>
@@ -9480,7 +9491,7 @@
       </p:grpSpPr>
       <p:sp>
         <p:nvSpPr>
-          <p:cNvPr id="73" name="Google Shape;73;p3"/>
+          <p:cNvPr id="73" name="Google Shape;73;p15"/>
           <p:cNvSpPr txBox="1"/>
           <p:nvPr>
             <p:ph idx="1" type="body"/>
@@ -9620,12 +9631,27 @@
             </a:pPr>
             <a:r>
               <a:rPr lang="it"/>
-              <a:t>~1000000+ Downloads</a:t>
+              <a:t>~</a:t>
+            </a:r>
+            <a:r>
+              <a:rPr lang="it"/>
+              <a:t>1</a:t>
+            </a:r>
+            <a:r>
+              <a:rPr lang="it"/>
+              <a:t>mln</a:t>
+            </a:r>
+            <a:r>
+              <a:rPr lang="it"/>
+              <a:t>+ Downloads</a:t>
             </a:r>
             <a:endParaRPr/>
           </a:p>
           <a:p>
             <a:pPr indent="-317500" lvl="0" marL="457200" rtl="0" algn="l">
+              <a:lnSpc>
+                <a:spcPct val="115000"/>
+              </a:lnSpc>
               <a:spcBef>
                 <a:spcPts val="1200"/>
               </a:spcBef>
@@ -9637,7 +9663,62 @@
             </a:pPr>
             <a:r>
               <a:rPr lang="it"/>
-              <a:t>~500000+ App Purchased</a:t>
+              <a:t>~</a:t>
+            </a:r>
+            <a:r>
+              <a:rPr lang="it"/>
+              <a:t>500</a:t>
+            </a:r>
+            <a:r>
+              <a:rPr lang="it"/>
+              <a:t>k</a:t>
+            </a:r>
+            <a:r>
+              <a:rPr lang="it"/>
+              <a:t>+ App Purchased</a:t>
+            </a:r>
+            <a:endParaRPr/>
+          </a:p>
+          <a:p>
+            <a:pPr indent="-317500" lvl="0" marL="457200" rtl="0" algn="l">
+              <a:lnSpc>
+                <a:spcPct val="115000"/>
+              </a:lnSpc>
+              <a:spcBef>
+                <a:spcPts val="1200"/>
+              </a:spcBef>
+              <a:spcAft>
+                <a:spcPts val="0"/>
+              </a:spcAft>
+              <a:buSzPts val="1400"/>
+              <a:buAutoNum type="arabicPeriod"/>
+            </a:pPr>
+            <a:r>
+              <a:rPr lang="it"/>
+              <a:t>~15</a:t>
+            </a:r>
+            <a:r>
+              <a:rPr lang="it"/>
+              <a:t>mln</a:t>
+            </a:r>
+            <a:r>
+              <a:rPr lang="it" sz="1150">
+                <a:solidFill>
+                  <a:srgbClr val="282829"/>
+                </a:solidFill>
+                <a:highlight>
+                  <a:srgbClr val="FFFFFF"/>
+                </a:highlight>
+                <a:latin typeface="Roboto"/>
+                <a:ea typeface="Roboto"/>
+                <a:cs typeface="Roboto"/>
+                <a:sym typeface="Roboto"/>
+              </a:rPr>
+              <a:t> </a:t>
+            </a:r>
+            <a:r>
+              <a:rPr lang="it"/>
+              <a:t>Impression a month with ~30 ads each month for user</a:t>
             </a:r>
             <a:endParaRPr/>
           </a:p>
@@ -9645,7 +9726,7 @@
       </p:sp>
       <p:sp>
         <p:nvSpPr>
-          <p:cNvPr id="74" name="Google Shape;74;p3"/>
+          <p:cNvPr id="74" name="Google Shape;74;p15"/>
           <p:cNvSpPr txBox="1"/>
           <p:nvPr>
             <p:ph type="title"/>
@@ -9693,7 +9774,7 @@
       </p:sp>
       <p:sp>
         <p:nvSpPr>
-          <p:cNvPr id="75" name="Google Shape;75;p3"/>
+          <p:cNvPr id="75" name="Google Shape;75;p15"/>
           <p:cNvSpPr txBox="1"/>
           <p:nvPr>
             <p:ph idx="2" type="body"/>
@@ -9739,6 +9820,9 @@
           </a:p>
           <a:p>
             <a:pPr indent="-317500" lvl="0" marL="457200" rtl="0" algn="l">
+              <a:lnSpc>
+                <a:spcPct val="115000"/>
+              </a:lnSpc>
               <a:spcBef>
                 <a:spcPts val="0"/>
               </a:spcBef>
@@ -9750,16 +9834,19 @@
             </a:pPr>
             <a:r>
               <a:rPr lang="it"/>
-              <a:t>S</a:t>
+              <a:t>Purchase</a:t>
             </a:r>
             <a:r>
               <a:rPr lang="it"/>
-              <a:t>ubscription to access more features</a:t>
+              <a:t> to access more features</a:t>
             </a:r>
             <a:endParaRPr/>
           </a:p>
           <a:p>
             <a:pPr indent="-317500" lvl="0" marL="457200" rtl="0" algn="l">
+              <a:lnSpc>
+                <a:spcPct val="115000"/>
+              </a:lnSpc>
               <a:spcBef>
                 <a:spcPts val="0"/>
               </a:spcBef>
@@ -9777,12 +9864,16 @@
           </a:p>
           <a:p>
             <a:pPr indent="0" lvl="0" marL="457200" rtl="0" algn="l">
-              <a:spcBef>
-                <a:spcPts val="0"/>
-              </a:spcBef>
-              <a:spcAft>
-                <a:spcPts val="0"/>
-              </a:spcAft>
+              <a:lnSpc>
+                <a:spcPct val="115000"/>
+              </a:lnSpc>
+              <a:spcBef>
+                <a:spcPts val="0"/>
+              </a:spcBef>
+              <a:spcAft>
+                <a:spcPts val="0"/>
+              </a:spcAft>
+              <a:buSzPts val="1400"/>
               <a:buNone/>
             </a:pPr>
             <a:r>
@@ -9826,11 +9917,7 @@
             </a:pPr>
             <a:r>
               <a:rPr lang="it"/>
-              <a:t>App Purchased: </a:t>
-            </a:r>
-            <a:r>
-              <a:rPr lang="it"/>
-              <a:t>0,99 USD </a:t>
+              <a:t>App Purchased: 0,99 USD </a:t>
             </a:r>
             <a:endParaRPr/>
           </a:p>
@@ -9850,7 +9937,46 @@
             </a:pPr>
             <a:r>
               <a:rPr lang="it"/>
-              <a:t>Banner ads: between %0.50 and $1.20 per 1,000 impressions served.</a:t>
+              <a:t>Banner ads: $0,05 CPC.</a:t>
+            </a:r>
+            <a:endParaRPr/>
+          </a:p>
+          <a:p>
+            <a:pPr indent="-317500" lvl="0" marL="457200" rtl="0" algn="l">
+              <a:lnSpc>
+                <a:spcPct val="115000"/>
+              </a:lnSpc>
+              <a:spcBef>
+                <a:spcPts val="0"/>
+              </a:spcBef>
+              <a:spcAft>
+                <a:spcPts val="0"/>
+              </a:spcAft>
+              <a:buSzPts val="1400"/>
+              <a:buAutoNum type="arabicPeriod"/>
+            </a:pPr>
+            <a:r>
+              <a:rPr lang="it"/>
+              <a:t>~</a:t>
+            </a:r>
+            <a:r>
+              <a:rPr lang="it"/>
+              <a:t>495.000 USD by App Purchases</a:t>
+            </a:r>
+            <a:br>
+              <a:rPr lang="it"/>
+            </a:br>
+            <a:r>
+              <a:rPr lang="it"/>
+              <a:t>and between $500k and </a:t>
+            </a:r>
+            <a:r>
+              <a:rPr lang="it"/>
+              <a:t>$750k </a:t>
+            </a:r>
+            <a:r>
+              <a:rPr lang="it"/>
+              <a:t>by Banner ads.</a:t>
             </a:r>
             <a:endParaRPr/>
           </a:p>
@@ -9858,7 +9984,7 @@
       </p:sp>
       <p:sp>
         <p:nvSpPr>
-          <p:cNvPr id="76" name="Google Shape;76;p3"/>
+          <p:cNvPr id="76" name="Google Shape;76;p15"/>
           <p:cNvSpPr txBox="1"/>
           <p:nvPr/>
         </p:nvSpPr>
@@ -9908,55 +10034,67 @@
                 <a:cs typeface="Arial"/>
                 <a:sym typeface="Arial"/>
               </a:rPr>
-              <a:t>data sourc</a:t>
+              <a:t>data source: </a:t>
             </a:r>
             <a:r>
-              <a:rPr lang="it" sz="800">
-                <a:solidFill>
-                  <a:schemeClr val="dk1"/>
-                </a:solidFill>
-              </a:rPr>
-              <a:t>e: </a:t>
-            </a:r>
-            <a:r>
-              <a:rPr lang="it" sz="800" u="sng">
+              <a:rPr b="0" i="0" lang="it" sz="800" u="sng" cap="none" strike="noStrike">
                 <a:solidFill>
                   <a:schemeClr val="hlink"/>
                 </a:solidFill>
+                <a:latin typeface="Arial"/>
+                <a:ea typeface="Arial"/>
+                <a:cs typeface="Arial"/>
+                <a:sym typeface="Arial"/>
                 <a:hlinkClick r:id="rId3"/>
               </a:rPr>
               <a:t>Slide Box</a:t>
             </a:r>
             <a:r>
-              <a:rPr lang="it" sz="800">
+              <a:rPr b="0" i="0" lang="it" sz="800" u="none" cap="none" strike="noStrike">
                 <a:solidFill>
                   <a:schemeClr val="dk1"/>
                 </a:solidFill>
+                <a:latin typeface="Arial"/>
+                <a:ea typeface="Arial"/>
+                <a:cs typeface="Arial"/>
+                <a:sym typeface="Arial"/>
               </a:rPr>
               <a:t>, </a:t>
             </a:r>
             <a:r>
-              <a:rPr lang="it" sz="800" u="sng">
+              <a:rPr b="0" i="0" lang="it" sz="800" u="sng" cap="none" strike="noStrike">
                 <a:solidFill>
                   <a:schemeClr val="hlink"/>
                 </a:solidFill>
+                <a:latin typeface="Arial"/>
+                <a:ea typeface="Arial"/>
+                <a:cs typeface="Arial"/>
+                <a:sym typeface="Arial"/>
                 <a:hlinkClick r:id="rId4"/>
               </a:rPr>
               <a:t>Simple Gallery</a:t>
             </a:r>
             <a:r>
-              <a:rPr lang="it" sz="800">
+              <a:rPr b="0" i="0" lang="it" sz="800" u="none" cap="none" strike="noStrike">
                 <a:solidFill>
                   <a:schemeClr val="dk1"/>
                 </a:solidFill>
+                <a:latin typeface="Arial"/>
+                <a:ea typeface="Arial"/>
+                <a:cs typeface="Arial"/>
+                <a:sym typeface="Arial"/>
               </a:rPr>
               <a:t>, </a:t>
             </a:r>
             <a:r>
-              <a:rPr lang="it" sz="800" u="sng">
+              <a:rPr b="0" i="0" lang="it" sz="800" u="sng" cap="none" strike="noStrike">
                 <a:solidFill>
                   <a:schemeClr val="hlink"/>
                 </a:solidFill>
+                <a:latin typeface="Arial"/>
+                <a:ea typeface="Arial"/>
+                <a:cs typeface="Arial"/>
+                <a:sym typeface="Arial"/>
                 <a:hlinkClick r:id="rId5"/>
               </a:rPr>
               <a:t>Simple Gallery PRO</a:t>
@@ -9975,7 +10113,7 @@
       </p:sp>
       <p:sp>
         <p:nvSpPr>
-          <p:cNvPr id="77" name="Google Shape;77;p3"/>
+          <p:cNvPr id="77" name="Google Shape;77;p15"/>
           <p:cNvSpPr txBox="1"/>
           <p:nvPr/>
         </p:nvSpPr>
@@ -9998,7 +10136,7 @@
           </a:bodyPr>
           <a:lstStyle/>
           <a:p>
-            <a:pPr indent="0" lvl="0" marL="0" rtl="0" algn="l">
+            <a:pPr indent="0" lvl="0" marL="0" marR="0" rtl="0" algn="l">
               <a:lnSpc>
                 <a:spcPct val="115000"/>
               </a:lnSpc>
@@ -10008,22 +10146,47 @@
               <a:spcAft>
                 <a:spcPts val="0"/>
               </a:spcAft>
+              <a:buClr>
+                <a:srgbClr val="000000"/>
+              </a:buClr>
+              <a:buSzPts val="1200"/>
+              <a:buFont typeface="Arial"/>
               <a:buNone/>
             </a:pPr>
             <a:r>
-              <a:rPr lang="it" sz="1200"/>
+              <a:rPr b="0" i="0" lang="it" sz="1200" u="none" cap="none" strike="noStrike">
+                <a:solidFill>
+                  <a:srgbClr val="000000"/>
+                </a:solidFill>
+                <a:latin typeface="Arial"/>
+                <a:ea typeface="Arial"/>
+                <a:cs typeface="Arial"/>
+                <a:sym typeface="Arial"/>
+              </a:rPr>
               <a:t>Interested? </a:t>
             </a:r>
             <a:r>
-              <a:rPr lang="it" sz="1200" u="sng">
+              <a:rPr b="0" i="0" lang="it" sz="1200" u="sng" cap="none" strike="noStrike">
                 <a:solidFill>
                   <a:schemeClr val="hlink"/>
                 </a:solidFill>
+                <a:latin typeface="Arial"/>
+                <a:ea typeface="Arial"/>
+                <a:cs typeface="Arial"/>
+                <a:sym typeface="Arial"/>
                 <a:hlinkClick r:id="rId6"/>
               </a:rPr>
               <a:t>See more</a:t>
             </a:r>
-            <a:endParaRPr sz="1200"/>
+            <a:endParaRPr b="0" i="0" sz="1200" u="none" cap="none" strike="noStrike">
+              <a:solidFill>
+                <a:srgbClr val="000000"/>
+              </a:solidFill>
+              <a:latin typeface="Arial"/>
+              <a:ea typeface="Arial"/>
+              <a:cs typeface="Arial"/>
+              <a:sym typeface="Arial"/>
+            </a:endParaRPr>
           </a:p>
         </p:txBody>
       </p:sp>
@@ -10036,6 +10199,285 @@
 </file>
 
 <file path=ppt/theme/theme1.xml><?xml version="1.0" encoding="utf-8"?>
+<a:theme xmlns:a="http://schemas.openxmlformats.org/drawingml/2006/main" xmlns:r="http://schemas.openxmlformats.org/officeDocument/2006/relationships" name="Simple Light">
+  <a:themeElements>
+    <a:clrScheme name="Simple Light">
+      <a:dk1>
+        <a:srgbClr val="000000"/>
+      </a:dk1>
+      <a:lt1>
+        <a:srgbClr val="FFFFFF"/>
+      </a:lt1>
+      <a:dk2>
+        <a:srgbClr val="595959"/>
+      </a:dk2>
+      <a:lt2>
+        <a:srgbClr val="EEEEEE"/>
+      </a:lt2>
+      <a:accent1>
+        <a:srgbClr val="4285F4"/>
+      </a:accent1>
+      <a:accent2>
+        <a:srgbClr val="212121"/>
+      </a:accent2>
+      <a:accent3>
+        <a:srgbClr val="78909C"/>
+      </a:accent3>
+      <a:accent4>
+        <a:srgbClr val="FFAB40"/>
+      </a:accent4>
+      <a:accent5>
+        <a:srgbClr val="0097A7"/>
+      </a:accent5>
+      <a:accent6>
+        <a:srgbClr val="EEFF41"/>
+      </a:accent6>
+      <a:hlink>
+        <a:srgbClr val="0097A7"/>
+      </a:hlink>
+      <a:folHlink>
+        <a:srgbClr val="0097A7"/>
+      </a:folHlink>
+    </a:clrScheme>
+    <a:fontScheme name="Office">
+      <a:majorFont>
+        <a:latin typeface="Arial"/>
+        <a:ea typeface=""/>
+        <a:cs typeface=""/>
+        <a:font script="Jpan" typeface="ＭＳ Ｐゴシック"/>
+        <a:font script="Hang" typeface="맑은 고딕"/>
+        <a:font script="Hans" typeface="宋体"/>
+        <a:font script="Hant" typeface="新細明體"/>
+        <a:font script="Arab" typeface="Times New Roman"/>
+        <a:font script="Hebr" typeface="Times New Roman"/>
+        <a:font script="Thai" typeface="Angsana New"/>
+        <a:font script="Ethi" typeface="Nyala"/>
+        <a:font script="Beng" typeface="Vrinda"/>
+        <a:font script="Gujr" typeface="Shruti"/>
+        <a:font script="Khmr" typeface="MoolBoran"/>
+        <a:font script="Knda" typeface="Tunga"/>
+        <a:font script="Guru" typeface="Raavi"/>
+        <a:font script="Cans" typeface="Euphemia"/>
+        <a:font script="Cher" typeface="Plantagenet Cherokee"/>
+        <a:font script="Yiii" typeface="Microsoft Yi Baiti"/>
+        <a:font script="Tibt" typeface="Microsoft Himalaya"/>
+        <a:font script="Thaa" typeface="MV Boli"/>
+        <a:font script="Deva" typeface="Mangal"/>
+        <a:font script="Telu" typeface="Gautami"/>
+        <a:font script="Taml" typeface="Latha"/>
+        <a:font script="Syrc" typeface="Estrangelo Edessa"/>
+        <a:font script="Orya" typeface="Kalinga"/>
+        <a:font script="Mlym" typeface="Kartika"/>
+        <a:font script="Laoo" typeface="DokChampa"/>
+        <a:font script="Sinh" typeface="Iskoola Pota"/>
+        <a:font script="Mong" typeface="Mongolian Baiti"/>
+        <a:font script="Viet" typeface="Times New Roman"/>
+        <a:font script="Uigh" typeface="Microsoft Uighur"/>
+        <a:font script="Geor" typeface="Sylfaen"/>
+      </a:majorFont>
+      <a:minorFont>
+        <a:latin typeface="Arial"/>
+        <a:ea typeface=""/>
+        <a:cs typeface=""/>
+        <a:font script="Jpan" typeface="ＭＳ Ｐゴシック"/>
+        <a:font script="Hang" typeface="맑은 고딕"/>
+        <a:font script="Hans" typeface="宋体"/>
+        <a:font script="Hant" typeface="新細明體"/>
+        <a:font script="Arab" typeface="Arial"/>
+        <a:font script="Hebr" typeface="Arial"/>
+        <a:font script="Thai" typeface="Cordia New"/>
+        <a:font script="Ethi" typeface="Nyala"/>
+        <a:font script="Beng" typeface="Vrinda"/>
+        <a:font script="Gujr" typeface="Shruti"/>
+        <a:font script="Khmr" typeface="DaunPenh"/>
+        <a:font script="Knda" typeface="Tunga"/>
+        <a:font script="Guru" typeface="Raavi"/>
+        <a:font script="Cans" typeface="Euphemia"/>
+        <a:font script="Cher" typeface="Plantagenet Cherokee"/>
+        <a:font script="Yiii" typeface="Microsoft Yi Baiti"/>
+        <a:font script="Tibt" typeface="Microsoft Himalaya"/>
+        <a:font script="Thaa" typeface="MV Boli"/>
+        <a:font script="Deva" typeface="Mangal"/>
+        <a:font script="Telu" typeface="Gautami"/>
+        <a:font script="Taml" typeface="Latha"/>
+        <a:font script="Syrc" typeface="Estrangelo Edessa"/>
+        <a:font script="Orya" typeface="Kalinga"/>
+        <a:font script="Mlym" typeface="Kartika"/>
+        <a:font script="Laoo" typeface="DokChampa"/>
+        <a:font script="Sinh" typeface="Iskoola Pota"/>
+        <a:font script="Mong" typeface="Mongolian Baiti"/>
+        <a:font script="Viet" typeface="Arial"/>
+        <a:font script="Uigh" typeface="Microsoft Uighur"/>
+        <a:font script="Geor" typeface="Sylfaen"/>
+      </a:minorFont>
+    </a:fontScheme>
+    <a:fmtScheme name="Office">
+      <a:fillStyleLst>
+        <a:solidFill>
+          <a:schemeClr val="phClr"/>
+        </a:solidFill>
+        <a:gradFill rotWithShape="1">
+          <a:gsLst>
+            <a:gs pos="0">
+              <a:schemeClr val="phClr">
+                <a:tint val="50000"/>
+                <a:satMod val="300000"/>
+              </a:schemeClr>
+            </a:gs>
+            <a:gs pos="35000">
+              <a:schemeClr val="phClr">
+                <a:tint val="37000"/>
+                <a:satMod val="300000"/>
+              </a:schemeClr>
+            </a:gs>
+            <a:gs pos="100000">
+              <a:schemeClr val="phClr">
+                <a:tint val="15000"/>
+                <a:satMod val="350000"/>
+              </a:schemeClr>
+            </a:gs>
+          </a:gsLst>
+          <a:lin ang="16200000" scaled="1"/>
+        </a:gradFill>
+        <a:gradFill rotWithShape="1">
+          <a:gsLst>
+            <a:gs pos="0">
+              <a:schemeClr val="phClr">
+                <a:tint val="100000"/>
+                <a:shade val="100000"/>
+                <a:satMod val="130000"/>
+              </a:schemeClr>
+            </a:gs>
+            <a:gs pos="100000">
+              <a:schemeClr val="phClr">
+                <a:tint val="50000"/>
+                <a:shade val="100000"/>
+                <a:satMod val="350000"/>
+              </a:schemeClr>
+            </a:gs>
+          </a:gsLst>
+          <a:lin ang="16200000" scaled="0"/>
+        </a:gradFill>
+      </a:fillStyleLst>
+      <a:lnStyleLst>
+        <a:ln w="9525" cap="flat" cmpd="sng" algn="ctr">
+          <a:solidFill>
+            <a:schemeClr val="phClr">
+              <a:shade val="95000"/>
+              <a:satMod val="105000"/>
+            </a:schemeClr>
+          </a:solidFill>
+          <a:prstDash val="solid"/>
+        </a:ln>
+        <a:ln w="25400" cap="flat" cmpd="sng" algn="ctr">
+          <a:solidFill>
+            <a:schemeClr val="phClr"/>
+          </a:solidFill>
+          <a:prstDash val="solid"/>
+        </a:ln>
+        <a:ln w="38100" cap="flat" cmpd="sng" algn="ctr">
+          <a:solidFill>
+            <a:schemeClr val="phClr"/>
+          </a:solidFill>
+          <a:prstDash val="solid"/>
+        </a:ln>
+      </a:lnStyleLst>
+      <a:effectStyleLst>
+        <a:effectStyle>
+          <a:effectLst>
+            <a:outerShdw blurRad="40000" dist="20000" dir="5400000" rotWithShape="0">
+              <a:srgbClr val="000000">
+                <a:alpha val="38000"/>
+              </a:srgbClr>
+            </a:outerShdw>
+          </a:effectLst>
+        </a:effectStyle>
+        <a:effectStyle>
+          <a:effectLst>
+            <a:outerShdw blurRad="40000" dist="23000" dir="5400000" rotWithShape="0">
+              <a:srgbClr val="000000">
+                <a:alpha val="35000"/>
+              </a:srgbClr>
+            </a:outerShdw>
+          </a:effectLst>
+        </a:effectStyle>
+        <a:effectStyle>
+          <a:effectLst>
+            <a:outerShdw blurRad="40000" dist="23000" dir="5400000" rotWithShape="0">
+              <a:srgbClr val="000000">
+                <a:alpha val="35000"/>
+              </a:srgbClr>
+            </a:outerShdw>
+          </a:effectLst>
+          <a:scene3d>
+            <a:camera prst="orthographicFront">
+              <a:rot lat="0" lon="0" rev="0"/>
+            </a:camera>
+            <a:lightRig rig="threePt" dir="t">
+              <a:rot lat="0" lon="0" rev="1200000"/>
+            </a:lightRig>
+          </a:scene3d>
+          <a:sp3d>
+            <a:bevelT w="63500" h="25400"/>
+          </a:sp3d>
+        </a:effectStyle>
+      </a:effectStyleLst>
+      <a:bgFillStyleLst>
+        <a:solidFill>
+          <a:schemeClr val="phClr"/>
+        </a:solidFill>
+        <a:gradFill rotWithShape="1">
+          <a:gsLst>
+            <a:gs pos="0">
+              <a:schemeClr val="phClr">
+                <a:tint val="40000"/>
+                <a:satMod val="350000"/>
+              </a:schemeClr>
+            </a:gs>
+            <a:gs pos="40000">
+              <a:schemeClr val="phClr">
+                <a:tint val="45000"/>
+                <a:shade val="99000"/>
+                <a:satMod val="350000"/>
+              </a:schemeClr>
+            </a:gs>
+            <a:gs pos="100000">
+              <a:schemeClr val="phClr">
+                <a:shade val="20000"/>
+                <a:satMod val="255000"/>
+              </a:schemeClr>
+            </a:gs>
+          </a:gsLst>
+          <a:path path="circle">
+            <a:fillToRect l="50000" t="-80000" r="50000" b="180000"/>
+          </a:path>
+        </a:gradFill>
+        <a:gradFill rotWithShape="1">
+          <a:gsLst>
+            <a:gs pos="0">
+              <a:schemeClr val="phClr">
+                <a:tint val="80000"/>
+                <a:satMod val="300000"/>
+              </a:schemeClr>
+            </a:gs>
+            <a:gs pos="100000">
+              <a:schemeClr val="phClr">
+                <a:shade val="30000"/>
+                <a:satMod val="200000"/>
+              </a:schemeClr>
+            </a:gs>
+          </a:gsLst>
+          <a:path path="circle">
+            <a:fillToRect l="50000" t="50000" r="50000" b="50000"/>
+          </a:path>
+        </a:gradFill>
+      </a:bgFillStyleLst>
+    </a:fmtScheme>
+  </a:themeElements>
+</a:theme>
+</file>
+
+<file path=ppt/theme/theme2.xml><?xml version="1.0" encoding="utf-8"?>
 <a:theme xmlns:a="http://schemas.openxmlformats.org/drawingml/2006/main" xmlns:r="http://schemas.openxmlformats.org/officeDocument/2006/relationships">
   <a:themeElements>
     <a:clrScheme name="Default">
@@ -10312,283 +10754,4 @@
     </a:fmtScheme>
   </a:themeElements>
 </a:theme>
-</file>
-
-<file path=ppt/theme/theme2.xml><?xml version="1.0" encoding="utf-8"?>
-<a:theme xmlns:a="http://schemas.openxmlformats.org/drawingml/2006/main" xmlns:r="http://schemas.openxmlformats.org/officeDocument/2006/relationships" name="Simple Light">
-  <a:themeElements>
-    <a:clrScheme name="Simple Light">
-      <a:dk1>
-        <a:srgbClr val="000000"/>
-      </a:dk1>
-      <a:lt1>
-        <a:srgbClr val="FFFFFF"/>
-      </a:lt1>
-      <a:dk2>
-        <a:srgbClr val="595959"/>
-      </a:dk2>
-      <a:lt2>
-        <a:srgbClr val="EEEEEE"/>
-      </a:lt2>
-      <a:accent1>
-        <a:srgbClr val="4285F4"/>
-      </a:accent1>
-      <a:accent2>
-        <a:srgbClr val="212121"/>
-      </a:accent2>
-      <a:accent3>
-        <a:srgbClr val="78909C"/>
-      </a:accent3>
-      <a:accent4>
-        <a:srgbClr val="FFAB40"/>
-      </a:accent4>
-      <a:accent5>
-        <a:srgbClr val="0097A7"/>
-      </a:accent5>
-      <a:accent6>
-        <a:srgbClr val="EEFF41"/>
-      </a:accent6>
-      <a:hlink>
-        <a:srgbClr val="0097A7"/>
-      </a:hlink>
-      <a:folHlink>
-        <a:srgbClr val="0097A7"/>
-      </a:folHlink>
-    </a:clrScheme>
-    <a:fontScheme name="Office">
-      <a:majorFont>
-        <a:latin typeface="Arial"/>
-        <a:ea typeface=""/>
-        <a:cs typeface=""/>
-        <a:font script="Jpan" typeface="ＭＳ Ｐゴシック"/>
-        <a:font script="Hang" typeface="맑은 고딕"/>
-        <a:font script="Hans" typeface="宋体"/>
-        <a:font script="Hant" typeface="新細明體"/>
-        <a:font script="Arab" typeface="Times New Roman"/>
-        <a:font script="Hebr" typeface="Times New Roman"/>
-        <a:font script="Thai" typeface="Angsana New"/>
-        <a:font script="Ethi" typeface="Nyala"/>
-        <a:font script="Beng" typeface="Vrinda"/>
-        <a:font script="Gujr" typeface="Shruti"/>
-        <a:font script="Khmr" typeface="MoolBoran"/>
-        <a:font script="Knda" typeface="Tunga"/>
-        <a:font script="Guru" typeface="Raavi"/>
-        <a:font script="Cans" typeface="Euphemia"/>
-        <a:font script="Cher" typeface="Plantagenet Cherokee"/>
-        <a:font script="Yiii" typeface="Microsoft Yi Baiti"/>
-        <a:font script="Tibt" typeface="Microsoft Himalaya"/>
-        <a:font script="Thaa" typeface="MV Boli"/>
-        <a:font script="Deva" typeface="Mangal"/>
-        <a:font script="Telu" typeface="Gautami"/>
-        <a:font script="Taml" typeface="Latha"/>
-        <a:font script="Syrc" typeface="Estrangelo Edessa"/>
-        <a:font script="Orya" typeface="Kalinga"/>
-        <a:font script="Mlym" typeface="Kartika"/>
-        <a:font script="Laoo" typeface="DokChampa"/>
-        <a:font script="Sinh" typeface="Iskoola Pota"/>
-        <a:font script="Mong" typeface="Mongolian Baiti"/>
-        <a:font script="Viet" typeface="Times New Roman"/>
-        <a:font script="Uigh" typeface="Microsoft Uighur"/>
-        <a:font script="Geor" typeface="Sylfaen"/>
-      </a:majorFont>
-      <a:minorFont>
-        <a:latin typeface="Arial"/>
-        <a:ea typeface=""/>
-        <a:cs typeface=""/>
-        <a:font script="Jpan" typeface="ＭＳ Ｐゴシック"/>
-        <a:font script="Hang" typeface="맑은 고딕"/>
-        <a:font script="Hans" typeface="宋体"/>
-        <a:font script="Hant" typeface="新細明體"/>
-        <a:font script="Arab" typeface="Arial"/>
-        <a:font script="Hebr" typeface="Arial"/>
-        <a:font script="Thai" typeface="Cordia New"/>
-        <a:font script="Ethi" typeface="Nyala"/>
-        <a:font script="Beng" typeface="Vrinda"/>
-        <a:font script="Gujr" typeface="Shruti"/>
-        <a:font script="Khmr" typeface="DaunPenh"/>
-        <a:font script="Knda" typeface="Tunga"/>
-        <a:font script="Guru" typeface="Raavi"/>
-        <a:font script="Cans" typeface="Euphemia"/>
-        <a:font script="Cher" typeface="Plantagenet Cherokee"/>
-        <a:font script="Yiii" typeface="Microsoft Yi Baiti"/>
-        <a:font script="Tibt" typeface="Microsoft Himalaya"/>
-        <a:font script="Thaa" typeface="MV Boli"/>
-        <a:font script="Deva" typeface="Mangal"/>
-        <a:font script="Telu" typeface="Gautami"/>
-        <a:font script="Taml" typeface="Latha"/>
-        <a:font script="Syrc" typeface="Estrangelo Edessa"/>
-        <a:font script="Orya" typeface="Kalinga"/>
-        <a:font script="Mlym" typeface="Kartika"/>
-        <a:font script="Laoo" typeface="DokChampa"/>
-        <a:font script="Sinh" typeface="Iskoola Pota"/>
-        <a:font script="Mong" typeface="Mongolian Baiti"/>
-        <a:font script="Viet" typeface="Arial"/>
-        <a:font script="Uigh" typeface="Microsoft Uighur"/>
-        <a:font script="Geor" typeface="Sylfaen"/>
-      </a:minorFont>
-    </a:fontScheme>
-    <a:fmtScheme name="Office">
-      <a:fillStyleLst>
-        <a:solidFill>
-          <a:schemeClr val="phClr"/>
-        </a:solidFill>
-        <a:gradFill rotWithShape="1">
-          <a:gsLst>
-            <a:gs pos="0">
-              <a:schemeClr val="phClr">
-                <a:tint val="50000"/>
-                <a:satMod val="300000"/>
-              </a:schemeClr>
-            </a:gs>
-            <a:gs pos="35000">
-              <a:schemeClr val="phClr">
-                <a:tint val="37000"/>
-                <a:satMod val="300000"/>
-              </a:schemeClr>
-            </a:gs>
-            <a:gs pos="100000">
-              <a:schemeClr val="phClr">
-                <a:tint val="15000"/>
-                <a:satMod val="350000"/>
-              </a:schemeClr>
-            </a:gs>
-          </a:gsLst>
-          <a:lin ang="16200000" scaled="1"/>
-        </a:gradFill>
-        <a:gradFill rotWithShape="1">
-          <a:gsLst>
-            <a:gs pos="0">
-              <a:schemeClr val="phClr">
-                <a:tint val="100000"/>
-                <a:shade val="100000"/>
-                <a:satMod val="130000"/>
-              </a:schemeClr>
-            </a:gs>
-            <a:gs pos="100000">
-              <a:schemeClr val="phClr">
-                <a:tint val="50000"/>
-                <a:shade val="100000"/>
-                <a:satMod val="350000"/>
-              </a:schemeClr>
-            </a:gs>
-          </a:gsLst>
-          <a:lin ang="16200000" scaled="0"/>
-        </a:gradFill>
-      </a:fillStyleLst>
-      <a:lnStyleLst>
-        <a:ln w="9525" cap="flat" cmpd="sng" algn="ctr">
-          <a:solidFill>
-            <a:schemeClr val="phClr">
-              <a:shade val="95000"/>
-              <a:satMod val="105000"/>
-            </a:schemeClr>
-          </a:solidFill>
-          <a:prstDash val="solid"/>
-        </a:ln>
-        <a:ln w="25400" cap="flat" cmpd="sng" algn="ctr">
-          <a:solidFill>
-            <a:schemeClr val="phClr"/>
-          </a:solidFill>
-          <a:prstDash val="solid"/>
-        </a:ln>
-        <a:ln w="38100" cap="flat" cmpd="sng" algn="ctr">
-          <a:solidFill>
-            <a:schemeClr val="phClr"/>
-          </a:solidFill>
-          <a:prstDash val="solid"/>
-        </a:ln>
-      </a:lnStyleLst>
-      <a:effectStyleLst>
-        <a:effectStyle>
-          <a:effectLst>
-            <a:outerShdw blurRad="40000" dist="20000" dir="5400000" rotWithShape="0">
-              <a:srgbClr val="000000">
-                <a:alpha val="38000"/>
-              </a:srgbClr>
-            </a:outerShdw>
-          </a:effectLst>
-        </a:effectStyle>
-        <a:effectStyle>
-          <a:effectLst>
-            <a:outerShdw blurRad="40000" dist="23000" dir="5400000" rotWithShape="0">
-              <a:srgbClr val="000000">
-                <a:alpha val="35000"/>
-              </a:srgbClr>
-            </a:outerShdw>
-          </a:effectLst>
-        </a:effectStyle>
-        <a:effectStyle>
-          <a:effectLst>
-            <a:outerShdw blurRad="40000" dist="23000" dir="5400000" rotWithShape="0">
-              <a:srgbClr val="000000">
-                <a:alpha val="35000"/>
-              </a:srgbClr>
-            </a:outerShdw>
-          </a:effectLst>
-          <a:scene3d>
-            <a:camera prst="orthographicFront">
-              <a:rot lat="0" lon="0" rev="0"/>
-            </a:camera>
-            <a:lightRig rig="threePt" dir="t">
-              <a:rot lat="0" lon="0" rev="1200000"/>
-            </a:lightRig>
-          </a:scene3d>
-          <a:sp3d>
-            <a:bevelT w="63500" h="25400"/>
-          </a:sp3d>
-        </a:effectStyle>
-      </a:effectStyleLst>
-      <a:bgFillStyleLst>
-        <a:solidFill>
-          <a:schemeClr val="phClr"/>
-        </a:solidFill>
-        <a:gradFill rotWithShape="1">
-          <a:gsLst>
-            <a:gs pos="0">
-              <a:schemeClr val="phClr">
-                <a:tint val="40000"/>
-                <a:satMod val="350000"/>
-              </a:schemeClr>
-            </a:gs>
-            <a:gs pos="40000">
-              <a:schemeClr val="phClr">
-                <a:tint val="45000"/>
-                <a:shade val="99000"/>
-                <a:satMod val="350000"/>
-              </a:schemeClr>
-            </a:gs>
-            <a:gs pos="100000">
-              <a:schemeClr val="phClr">
-                <a:shade val="20000"/>
-                <a:satMod val="255000"/>
-              </a:schemeClr>
-            </a:gs>
-          </a:gsLst>
-          <a:path path="circle">
-            <a:fillToRect l="50000" t="-80000" r="50000" b="180000"/>
-          </a:path>
-        </a:gradFill>
-        <a:gradFill rotWithShape="1">
-          <a:gsLst>
-            <a:gs pos="0">
-              <a:schemeClr val="phClr">
-                <a:tint val="80000"/>
-                <a:satMod val="300000"/>
-              </a:schemeClr>
-            </a:gs>
-            <a:gs pos="100000">
-              <a:schemeClr val="phClr">
-                <a:shade val="30000"/>
-                <a:satMod val="200000"/>
-              </a:schemeClr>
-            </a:gs>
-          </a:gsLst>
-          <a:path path="circle">
-            <a:fillToRect l="50000" t="50000" r="50000" b="50000"/>
-          </a:path>
-        </a:gradFill>
-      </a:bgFillStyleLst>
-    </a:fmtScheme>
-  </a:themeElements>
-</a:theme>
 </file>
</xml_diff>